<commit_message>
sửa báo thức và thông báo
</commit_message>
<xml_diff>
--- a/Nhom 09_De tai 1_Xay dung ung dung cham soc suc khoe PD_PTUDDD.pptx
+++ b/Nhom 09_De tai 1_Xay dung ung dung cham soc suc khoe PD_PTUDDD.pptx
@@ -6938,23 +6938,23 @@
               <a:t>B</a:t>
             </a:r>
             <a:r>
-              <a:rPr lang="" altLang="en-US" sz="2500" b="1">
-                <a:effectLst/>
-                <a:latin typeface="Times New Roman" panose="02020603050405020304" pitchFamily="18" charset="0"/>
-                <a:ea typeface="Times New Roman" panose="02020603050405020304" pitchFamily="18" charset="0"/>
-              </a:rPr>
-              <a:t>Á</a:t>
-            </a:r>
-            <a:r>
               <a:rPr lang="en-US" altLang="en-US" sz="2500" b="1">
                 <a:effectLst/>
                 <a:latin typeface="Times New Roman" panose="02020603050405020304" pitchFamily="18" charset="0"/>
                 <a:ea typeface="Times New Roman" panose="02020603050405020304" pitchFamily="18" charset="0"/>
               </a:rPr>
+              <a:t>Á</a:t>
+            </a:r>
+            <a:r>
+              <a:rPr lang="en-US" altLang="en-US" sz="2500" b="1">
+                <a:effectLst/>
+                <a:latin typeface="Times New Roman" panose="02020603050405020304" pitchFamily="18" charset="0"/>
+                <a:ea typeface="Times New Roman" panose="02020603050405020304" pitchFamily="18" charset="0"/>
+              </a:rPr>
               <a:t>O C</a:t>
             </a:r>
             <a:r>
-              <a:rPr lang="" altLang="en-US" sz="2500" b="1">
+              <a:rPr lang="en-US" altLang="en-US" sz="2500" b="1">
                 <a:effectLst/>
                 <a:latin typeface="Times New Roman" panose="02020603050405020304" pitchFamily="18" charset="0"/>
                 <a:ea typeface="Times New Roman" panose="02020603050405020304" pitchFamily="18" charset="0"/>
@@ -6986,23 +6986,23 @@
               <a:t>PH</a:t>
             </a:r>
             <a:r>
-              <a:rPr lang="" altLang="en-US" sz="2500" b="1">
-                <a:effectLst/>
-                <a:latin typeface="Times New Roman" panose="02020603050405020304" pitchFamily="18" charset="0"/>
-                <a:ea typeface="Times New Roman" panose="02020603050405020304" pitchFamily="18" charset="0"/>
-              </a:rPr>
-              <a:t>Á</a:t>
-            </a:r>
-            <a:r>
               <a:rPr lang="en-US" altLang="en-US" sz="2500" b="1">
                 <a:effectLst/>
                 <a:latin typeface="Times New Roman" panose="02020603050405020304" pitchFamily="18" charset="0"/>
                 <a:ea typeface="Times New Roman" panose="02020603050405020304" pitchFamily="18" charset="0"/>
               </a:rPr>
+              <a:t>Á</a:t>
+            </a:r>
+            <a:r>
+              <a:rPr lang="en-US" altLang="en-US" sz="2500" b="1">
+                <a:effectLst/>
+                <a:latin typeface="Times New Roman" panose="02020603050405020304" pitchFamily="18" charset="0"/>
+                <a:ea typeface="Times New Roman" panose="02020603050405020304" pitchFamily="18" charset="0"/>
+              </a:rPr>
               <a:t>T TRIỂN ỨNG DỤNG DI </a:t>
             </a:r>
             <a:r>
-              <a:rPr lang="" altLang="en-US" sz="2500" b="1">
+              <a:rPr lang="en-US" altLang="en-US" sz="2500" b="1">
                 <a:effectLst/>
                 <a:latin typeface="Times New Roman" panose="02020603050405020304" pitchFamily="18" charset="0"/>
                 <a:ea typeface="Times New Roman" panose="02020603050405020304" pitchFamily="18" charset="0"/>
@@ -7124,8 +7124,8 @@
         </p:nvSpPr>
         <p:spPr>
           <a:xfrm>
-            <a:off x="2879254" y="3673651"/>
-            <a:ext cx="6603356" cy="645160"/>
+            <a:off x="2397125" y="3673475"/>
+            <a:ext cx="8284210" cy="953135"/>
           </a:xfrm>
           <a:prstGeom prst="rect">
             <a:avLst/>
@@ -7144,7 +7144,7 @@
               </a:tabLst>
             </a:pPr>
             <a:r>
-              <a:rPr lang="en-US" sz="1800" b="1">
+              <a:rPr lang="en-US" sz="2800" b="1">
                 <a:effectLst/>
                 <a:latin typeface="Times New Roman" panose="02020603050405020304" pitchFamily="18" charset="0"/>
                 <a:ea typeface="Times New Roman" panose="02020603050405020304" pitchFamily="18" charset="0"/>
@@ -7152,14 +7152,14 @@
               <a:t>SV/ Nhóm SV</a:t>
             </a:r>
             <a:r>
-              <a:rPr lang="en-US" sz="1800">
+              <a:rPr lang="en-US" sz="2800">
                 <a:effectLst/>
                 <a:latin typeface="Times New Roman" panose="02020603050405020304" pitchFamily="18" charset="0"/>
                 <a:ea typeface="Times New Roman" panose="02020603050405020304" pitchFamily="18" charset="0"/>
               </a:rPr>
-              <a:t>: 1. Hồ Tuấn Phước </a:t>
-            </a:r>
-            <a:endParaRPr lang="en-US" sz="1800">
+              <a:t>: 	1. Hồ Tuấn Phước </a:t>
+            </a:r>
+            <a:endParaRPr lang="en-US" sz="2800">
               <a:effectLst/>
               <a:latin typeface="Times New Roman" panose="02020603050405020304" pitchFamily="18" charset="0"/>
               <a:ea typeface="Times New Roman" panose="02020603050405020304" pitchFamily="18" charset="0"/>
@@ -7172,7 +7172,7 @@
               </a:tabLst>
             </a:pPr>
             <a:r>
-              <a:rPr lang="en-US">
+              <a:rPr lang="en-US" sz="2800">
                 <a:effectLst/>
                 <a:latin typeface="Times New Roman" panose="02020603050405020304" pitchFamily="18" charset="0"/>
                 <a:ea typeface="Times New Roman" panose="02020603050405020304" pitchFamily="18" charset="0"/>
@@ -7180,14 +7180,14 @@
               <a:t>	</a:t>
             </a:r>
             <a:r>
-              <a:rPr lang="en-US">
+              <a:rPr lang="en-US" sz="2800">
                 <a:latin typeface="Times New Roman" panose="02020603050405020304" pitchFamily="18" charset="0"/>
                 <a:ea typeface="Times New Roman" panose="02020603050405020304" pitchFamily="18" charset="0"/>
               </a:rPr>
-              <a:t>  </a:t>
-            </a:r>
-            <a:r>
-              <a:rPr lang="en-US">
+              <a:t>  		</a:t>
+            </a:r>
+            <a:r>
+              <a:rPr lang="en-US" sz="2800">
                 <a:effectLst/>
                 <a:latin typeface="Times New Roman" panose="02020603050405020304" pitchFamily="18" charset="0"/>
                 <a:ea typeface="Times New Roman" panose="02020603050405020304" pitchFamily="18" charset="0"/>
@@ -7195,14 +7195,14 @@
               <a:t>2. </a:t>
             </a:r>
             <a:r>
-              <a:rPr lang="en-US" altLang="en-US" sz="1600">
+              <a:rPr lang="en-US" altLang="en-US" sz="2400">
                 <a:effectLst/>
                 <a:latin typeface="Times New Roman" panose="02020603050405020304" pitchFamily="18" charset="0"/>
                 <a:ea typeface="Times New Roman" panose="02020603050405020304" pitchFamily="18" charset="0"/>
               </a:rPr>
               <a:t>Thái Nguyễn Thiện Duyên</a:t>
             </a:r>
-            <a:endParaRPr lang="en-US" altLang="en-US" sz="1600">
+            <a:endParaRPr lang="en-US" altLang="en-US" sz="2400">
               <a:effectLst/>
               <a:latin typeface="Times New Roman" panose="02020603050405020304" pitchFamily="18" charset="0"/>
               <a:ea typeface="Times New Roman" panose="02020603050405020304" pitchFamily="18" charset="0"/>
@@ -9748,23 +9748,23 @@
               <a:t>Trong bối cảnh công nghệ 4.0, ứng dụng công nghệ thông tin vào y tế là xu h</a:t>
             </a:r>
             <a:r>
-              <a:rPr lang="" altLang="en-US" sz="2800">
-                <a:effectLst/>
-                <a:latin typeface="Times New Roman" panose="02020603050405020304" pitchFamily="18" charset="0"/>
-                <a:ea typeface="Times New Roman" panose="02020603050405020304" pitchFamily="18" charset="0"/>
-              </a:rPr>
-              <a:t>ư</a:t>
-            </a:r>
-            <a:r>
               <a:rPr lang="en-US" altLang="en-US" sz="2800">
                 <a:effectLst/>
                 <a:latin typeface="Times New Roman" panose="02020603050405020304" pitchFamily="18" charset="0"/>
                 <a:ea typeface="Times New Roman" panose="02020603050405020304" pitchFamily="18" charset="0"/>
               </a:rPr>
+              <a:t>ư</a:t>
+            </a:r>
+            <a:r>
+              <a:rPr lang="en-US" altLang="en-US" sz="2800">
+                <a:effectLst/>
+                <a:latin typeface="Times New Roman" panose="02020603050405020304" pitchFamily="18" charset="0"/>
+                <a:ea typeface="Times New Roman" panose="02020603050405020304" pitchFamily="18" charset="0"/>
+              </a:rPr>
               <a:t>ớng tất yếu. Tuy nhiên, tại Việt Nam, các ứng dụng ch</a:t>
             </a:r>
             <a:r>
-              <a:rPr lang="" altLang="en-US" sz="2800">
+              <a:rPr lang="en-US" altLang="en-US" sz="2800">
                 <a:effectLst/>
                 <a:latin typeface="Times New Roman" panose="02020603050405020304" pitchFamily="18" charset="0"/>
                 <a:ea typeface="Times New Roman" panose="02020603050405020304" pitchFamily="18" charset="0"/>
@@ -9804,27 +9804,11 @@
               <a:t>Nhiều ng</a:t>
             </a:r>
             <a:r>
-              <a:rPr lang="" altLang="en-US" sz="2800">
-                <a:effectLst/>
-                <a:latin typeface="Times New Roman" panose="02020603050405020304" pitchFamily="18" charset="0"/>
-                <a:ea typeface="Times New Roman" panose="02020603050405020304" pitchFamily="18" charset="0"/>
-              </a:rPr>
-              <a:t>ư</a:t>
-            </a:r>
-            <a:r>
               <a:rPr lang="en-US" altLang="en-US" sz="2800">
                 <a:effectLst/>
                 <a:latin typeface="Times New Roman" panose="02020603050405020304" pitchFamily="18" charset="0"/>
                 <a:ea typeface="Times New Roman" panose="02020603050405020304" pitchFamily="18" charset="0"/>
               </a:rPr>
-              <a:t>ời th</a:t>
-            </a:r>
-            <a:r>
-              <a:rPr lang="" altLang="en-US" sz="2800">
-                <a:effectLst/>
-                <a:latin typeface="Times New Roman" panose="02020603050405020304" pitchFamily="18" charset="0"/>
-                <a:ea typeface="Times New Roman" panose="02020603050405020304" pitchFamily="18" charset="0"/>
-              </a:rPr>
               <a:t>ư</a:t>
             </a:r>
             <a:r>
@@ -9833,10 +9817,26 @@
                 <a:latin typeface="Times New Roman" panose="02020603050405020304" pitchFamily="18" charset="0"/>
                 <a:ea typeface="Times New Roman" panose="02020603050405020304" pitchFamily="18" charset="0"/>
               </a:rPr>
+              <a:t>ời th</a:t>
+            </a:r>
+            <a:r>
+              <a:rPr lang="en-US" altLang="en-US" sz="2800">
+                <a:effectLst/>
+                <a:latin typeface="Times New Roman" panose="02020603050405020304" pitchFamily="18" charset="0"/>
+                <a:ea typeface="Times New Roman" panose="02020603050405020304" pitchFamily="18" charset="0"/>
+              </a:rPr>
+              <a:t>ư</a:t>
+            </a:r>
+            <a:r>
+              <a:rPr lang="en-US" altLang="en-US" sz="2800">
+                <a:effectLst/>
+                <a:latin typeface="Times New Roman" panose="02020603050405020304" pitchFamily="18" charset="0"/>
+                <a:ea typeface="Times New Roman" panose="02020603050405020304" pitchFamily="18" charset="0"/>
+              </a:rPr>
               <a:t>ờng chủ quan với dấu hiệu sức khỏe ban </a:t>
             </a:r>
             <a:r>
-              <a:rPr lang="" altLang="en-US" sz="2800">
+              <a:rPr lang="en-US" altLang="en-US" sz="2800">
                 <a:effectLst/>
                 <a:latin typeface="Times New Roman" panose="02020603050405020304" pitchFamily="18" charset="0"/>
                 <a:ea typeface="Times New Roman" panose="02020603050405020304" pitchFamily="18" charset="0"/>
@@ -10078,28 +10078,12 @@
               <a:t>1. Hỗ trợ ng</a:t>
             </a:r>
             <a:r>
-              <a:rPr lang="" altLang="en-US" sz="2800" b="1">
-                <a:effectLst/>
-                <a:latin typeface="Times New Roman" panose="02020603050405020304" pitchFamily="18" charset="0"/>
-                <a:ea typeface="Times New Roman" panose="02020603050405020304" pitchFamily="18" charset="0"/>
-              </a:rPr>
-              <a:t>ư</a:t>
-            </a:r>
-            <a:r>
               <a:rPr lang="en-US" altLang="en-US" sz="2800" b="1">
                 <a:effectLst/>
                 <a:latin typeface="Times New Roman" panose="02020603050405020304" pitchFamily="18" charset="0"/>
                 <a:ea typeface="Times New Roman" panose="02020603050405020304" pitchFamily="18" charset="0"/>
               </a:rPr>
-              <a:t>ời dùng theo d</a:t>
-            </a:r>
-            <a:r>
-              <a:rPr lang="" altLang="en-US" sz="2800" b="1">
-                <a:effectLst/>
-                <a:latin typeface="Times New Roman" panose="02020603050405020304" pitchFamily="18" charset="0"/>
-                <a:ea typeface="Times New Roman" panose="02020603050405020304" pitchFamily="18" charset="0"/>
-              </a:rPr>
-              <a:t>õ</a:t>
+              <a:t>ư</a:t>
             </a:r>
             <a:r>
               <a:rPr lang="en-US" altLang="en-US" sz="2800" b="1">
@@ -10107,10 +10091,26 @@
                 <a:latin typeface="Times New Roman" panose="02020603050405020304" pitchFamily="18" charset="0"/>
                 <a:ea typeface="Times New Roman" panose="02020603050405020304" pitchFamily="18" charset="0"/>
               </a:rPr>
+              <a:t>ời dùng theo d</a:t>
+            </a:r>
+            <a:r>
+              <a:rPr lang="en-US" altLang="en-US" sz="2800" b="1">
+                <a:effectLst/>
+                <a:latin typeface="Times New Roman" panose="02020603050405020304" pitchFamily="18" charset="0"/>
+                <a:ea typeface="Times New Roman" panose="02020603050405020304" pitchFamily="18" charset="0"/>
+              </a:rPr>
+              <a:t>õ</a:t>
+            </a:r>
+            <a:r>
+              <a:rPr lang="en-US" altLang="en-US" sz="2800" b="1">
+                <a:effectLst/>
+                <a:latin typeface="Times New Roman" panose="02020603050405020304" pitchFamily="18" charset="0"/>
+                <a:ea typeface="Times New Roman" panose="02020603050405020304" pitchFamily="18" charset="0"/>
+              </a:rPr>
               <a:t>i sức khỏe chủ </a:t>
             </a:r>
             <a:r>
-              <a:rPr lang="" altLang="en-US" sz="2800" b="1">
+              <a:rPr lang="en-US" altLang="en-US" sz="2800" b="1">
                 <a:effectLst/>
                 <a:latin typeface="Times New Roman" panose="02020603050405020304" pitchFamily="18" charset="0"/>
                 <a:ea typeface="Times New Roman" panose="02020603050405020304" pitchFamily="18" charset="0"/>
@@ -10150,7 +10150,7 @@
               <a:t>2. Ghi nhận và l</a:t>
             </a:r>
             <a:r>
-              <a:rPr lang="" altLang="en-US" sz="2800" b="1">
+              <a:rPr lang="en-US" altLang="en-US" sz="2800" b="1">
                 <a:effectLst/>
                 <a:latin typeface="Times New Roman" panose="02020603050405020304" pitchFamily="18" charset="0"/>
                 <a:ea typeface="Times New Roman" panose="02020603050405020304" pitchFamily="18" charset="0"/>
@@ -10238,7 +10238,7 @@
               <a:t>5. Mang lại trải nghiệm ch</a:t>
             </a:r>
             <a:r>
-              <a:rPr lang="" altLang="en-US" sz="2800" b="1">
+              <a:rPr lang="en-US" altLang="en-US" sz="2800" b="1">
                 <a:effectLst/>
                 <a:latin typeface="Times New Roman" panose="02020603050405020304" pitchFamily="18" charset="0"/>
                 <a:ea typeface="Times New Roman" panose="02020603050405020304" pitchFamily="18" charset="0"/>
@@ -10634,7 +10634,7 @@
               <a:t>Môi tr</a:t>
             </a:r>
             <a:r>
-              <a:rPr lang="" altLang="en-US" sz="2800" b="1" spc="100">
+              <a:rPr lang="en-US" altLang="en-US" sz="2800" b="1" spc="100">
                 <a:solidFill>
                   <a:schemeClr val="tx1"/>
                 </a:solidFill>

</xml_diff>